<commit_message>
Prezentacija: Karma & Jasmine
</commit_message>
<xml_diff>
--- a/UnitTestingFrameworks_VH_JN.pptx
+++ b/UnitTestingFrameworks_VH_JN.pptx
@@ -5,7 +5,7 @@
     <p:sldMasterId id="2147483792" r:id="rId1"/>
   </p:sldMasterIdLst>
   <p:notesMasterIdLst>
-    <p:notesMasterId r:id="rId11"/>
+    <p:notesMasterId r:id="rId18"/>
   </p:notesMasterIdLst>
   <p:sldIdLst>
     <p:sldId id="256" r:id="rId2"/>
@@ -17,6 +17,13 @@
     <p:sldId id="263" r:id="rId8"/>
     <p:sldId id="264" r:id="rId9"/>
     <p:sldId id="265" r:id="rId10"/>
+    <p:sldId id="267" r:id="rId11"/>
+    <p:sldId id="268" r:id="rId12"/>
+    <p:sldId id="266" r:id="rId13"/>
+    <p:sldId id="269" r:id="rId14"/>
+    <p:sldId id="271" r:id="rId15"/>
+    <p:sldId id="270" r:id="rId16"/>
+    <p:sldId id="272" r:id="rId17"/>
   </p:sldIdLst>
   <p:sldSz cx="12192000" cy="6858000"/>
   <p:notesSz cx="6858000" cy="9144000"/>
@@ -205,7 +212,7 @@
           <a:p>
             <a:fld id="{C3F13826-1A67-4C2D-8F45-B22AD686F7A2}" type="datetimeFigureOut">
               <a:rPr lang="en-US" smtClean="0"/>
-              <a:t>27-Apr-20</a:t>
+              <a:t>04-May-20</a:t>
             </a:fld>
             <a:endParaRPr lang="en-US"/>
           </a:p>
@@ -808,7 +815,7 @@
           <a:p>
             <a:fld id="{8B2AAE93-1203-4CB9-BFE2-D8321679B070}" type="datetimeFigureOut">
               <a:rPr lang="en-US" smtClean="0"/>
-              <a:t>27-Apr-20</a:t>
+              <a:t>04-May-20</a:t>
             </a:fld>
             <a:endParaRPr lang="en-US"/>
           </a:p>
@@ -1901,7 +1908,7 @@
           <a:p>
             <a:fld id="{8B2AAE93-1203-4CB9-BFE2-D8321679B070}" type="datetimeFigureOut">
               <a:rPr lang="en-US" smtClean="0"/>
-              <a:t>27-Apr-20</a:t>
+              <a:t>04-May-20</a:t>
             </a:fld>
             <a:endParaRPr lang="en-US"/>
           </a:p>
@@ -2881,7 +2888,7 @@
           <a:p>
             <a:fld id="{8B2AAE93-1203-4CB9-BFE2-D8321679B070}" type="datetimeFigureOut">
               <a:rPr lang="en-US" smtClean="0"/>
-              <a:t>27-Apr-20</a:t>
+              <a:t>04-May-20</a:t>
             </a:fld>
             <a:endParaRPr lang="en-US"/>
           </a:p>
@@ -4015,7 +4022,7 @@
           <a:p>
             <a:fld id="{8B2AAE93-1203-4CB9-BFE2-D8321679B070}" type="datetimeFigureOut">
               <a:rPr lang="en-US" smtClean="0"/>
-              <a:t>27-Apr-20</a:t>
+              <a:t>04-May-20</a:t>
             </a:fld>
             <a:endParaRPr lang="en-US"/>
           </a:p>
@@ -5048,7 +5055,7 @@
           <a:p>
             <a:fld id="{8B2AAE93-1203-4CB9-BFE2-D8321679B070}" type="datetimeFigureOut">
               <a:rPr lang="en-US" smtClean="0"/>
-              <a:t>27-Apr-20</a:t>
+              <a:t>04-May-20</a:t>
             </a:fld>
             <a:endParaRPr lang="en-US"/>
           </a:p>
@@ -5708,7 +5715,7 @@
           <a:p>
             <a:fld id="{8B2AAE93-1203-4CB9-BFE2-D8321679B070}" type="datetimeFigureOut">
               <a:rPr lang="en-US" smtClean="0"/>
-              <a:t>27-Apr-20</a:t>
+              <a:t>04-May-20</a:t>
             </a:fld>
             <a:endParaRPr lang="en-US"/>
           </a:p>
@@ -6569,7 +6576,7 @@
           <a:p>
             <a:fld id="{8B2AAE93-1203-4CB9-BFE2-D8321679B070}" type="datetimeFigureOut">
               <a:rPr lang="en-US" smtClean="0"/>
-              <a:t>27-Apr-20</a:t>
+              <a:t>04-May-20</a:t>
             </a:fld>
             <a:endParaRPr lang="en-US"/>
           </a:p>
@@ -6759,7 +6766,7 @@
           <a:p>
             <a:fld id="{8B2AAE93-1203-4CB9-BFE2-D8321679B070}" type="datetimeFigureOut">
               <a:rPr lang="en-US" smtClean="0"/>
-              <a:t>27-Apr-20</a:t>
+              <a:t>04-May-20</a:t>
             </a:fld>
             <a:endParaRPr lang="en-US"/>
           </a:p>
@@ -7731,7 +7738,7 @@
           <a:p>
             <a:fld id="{8B2AAE93-1203-4CB9-BFE2-D8321679B070}" type="datetimeFigureOut">
               <a:rPr lang="en-US" smtClean="0"/>
-              <a:t>27-Apr-20</a:t>
+              <a:t>04-May-20</a:t>
             </a:fld>
             <a:endParaRPr lang="en-US"/>
           </a:p>
@@ -7947,7 +7954,7 @@
           <a:p>
             <a:fld id="{8B2AAE93-1203-4CB9-BFE2-D8321679B070}" type="datetimeFigureOut">
               <a:rPr lang="en-US" smtClean="0"/>
-              <a:t>27-Apr-20</a:t>
+              <a:t>04-May-20</a:t>
             </a:fld>
             <a:endParaRPr lang="en-US"/>
           </a:p>
@@ -8981,7 +8988,7 @@
           <a:p>
             <a:fld id="{8B2AAE93-1203-4CB9-BFE2-D8321679B070}" type="datetimeFigureOut">
               <a:rPr lang="en-US" smtClean="0"/>
-              <a:t>27-Apr-20</a:t>
+              <a:t>04-May-20</a:t>
             </a:fld>
             <a:endParaRPr lang="en-US"/>
           </a:p>
@@ -9258,7 +9265,7 @@
           <a:p>
             <a:fld id="{8B2AAE93-1203-4CB9-BFE2-D8321679B070}" type="datetimeFigureOut">
               <a:rPr lang="en-US" smtClean="0"/>
-              <a:t>27-Apr-20</a:t>
+              <a:t>04-May-20</a:t>
             </a:fld>
             <a:endParaRPr lang="en-US"/>
           </a:p>
@@ -9668,7 +9675,7 @@
           <a:p>
             <a:fld id="{8B2AAE93-1203-4CB9-BFE2-D8321679B070}" type="datetimeFigureOut">
               <a:rPr lang="en-US" smtClean="0"/>
-              <a:t>27-Apr-20</a:t>
+              <a:t>04-May-20</a:t>
             </a:fld>
             <a:endParaRPr lang="en-US"/>
           </a:p>
@@ -9795,7 +9802,7 @@
           <a:p>
             <a:fld id="{8B2AAE93-1203-4CB9-BFE2-D8321679B070}" type="datetimeFigureOut">
               <a:rPr lang="en-US" smtClean="0"/>
-              <a:t>27-Apr-20</a:t>
+              <a:t>04-May-20</a:t>
             </a:fld>
             <a:endParaRPr lang="en-US"/>
           </a:p>
@@ -9890,7 +9897,7 @@
           <a:p>
             <a:fld id="{8B2AAE93-1203-4CB9-BFE2-D8321679B070}" type="datetimeFigureOut">
               <a:rPr lang="en-US" smtClean="0"/>
-              <a:t>27-Apr-20</a:t>
+              <a:t>04-May-20</a:t>
             </a:fld>
             <a:endParaRPr lang="en-US"/>
           </a:p>
@@ -10971,7 +10978,7 @@
           <a:p>
             <a:fld id="{8B2AAE93-1203-4CB9-BFE2-D8321679B070}" type="datetimeFigureOut">
               <a:rPr lang="en-US" smtClean="0"/>
-              <a:t>27-Apr-20</a:t>
+              <a:t>04-May-20</a:t>
             </a:fld>
             <a:endParaRPr lang="en-US"/>
           </a:p>
@@ -12079,7 +12086,7 @@
           <a:p>
             <a:fld id="{8B2AAE93-1203-4CB9-BFE2-D8321679B070}" type="datetimeFigureOut">
               <a:rPr lang="en-US" smtClean="0"/>
-              <a:t>27-Apr-20</a:t>
+              <a:t>04-May-20</a:t>
             </a:fld>
             <a:endParaRPr lang="en-US"/>
           </a:p>
@@ -13076,7 +13083,7 @@
           <a:p>
             <a:fld id="{8B2AAE93-1203-4CB9-BFE2-D8321679B070}" type="datetimeFigureOut">
               <a:rPr lang="en-US" smtClean="0"/>
-              <a:t>27-Apr-20</a:t>
+              <a:t>04-May-20</a:t>
             </a:fld>
             <a:endParaRPr lang="en-US"/>
           </a:p>
@@ -13652,8 +13659,8 @@
         </p:nvSpPr>
         <p:spPr>
           <a:xfrm>
-            <a:off x="1481525" y="1449976"/>
-            <a:ext cx="9478211" cy="1240973"/>
+            <a:off x="1285582" y="1804799"/>
+            <a:ext cx="9478211" cy="2008309"/>
           </a:xfrm>
         </p:spPr>
         <p:txBody>
@@ -13671,12 +13678,16 @@
               <a:rPr lang="en-US" dirty="0"/>
             </a:br>
             <a:r>
-              <a:rPr lang="en-US" sz="6700" b="1" dirty="0"/>
-              <a:t>U</a:t>
-            </a:r>
-            <a:r>
               <a:rPr lang="en-US" sz="6700" b="1" dirty="0" smtClean="0"/>
-              <a:t>nit </a:t>
+              <a:t>Angular</a:t>
+            </a:r>
+            <a:r>
+              <a:rPr lang="en-US" sz="6700" dirty="0" smtClean="0"/>
+              <a:t> </a:t>
+            </a:r>
+            <a:r>
+              <a:rPr lang="en-US" sz="6700" b="1" dirty="0" smtClean="0"/>
+              <a:t>Unit </a:t>
             </a:r>
             <a:r>
               <a:rPr lang="en-US" sz="6700" b="1" dirty="0"/>
@@ -13702,28 +13713,22 @@
         </p:nvSpPr>
         <p:spPr>
           <a:xfrm>
-            <a:off x="7393577" y="2808954"/>
-            <a:ext cx="3069772" cy="590321"/>
+            <a:off x="3790938" y="3783867"/>
+            <a:ext cx="4101738" cy="590321"/>
           </a:xfrm>
         </p:spPr>
         <p:txBody>
-          <a:bodyPr/>
+          <a:bodyPr>
+            <a:noAutofit/>
+          </a:bodyPr>
           <a:lstStyle/>
           <a:p>
             <a:pPr algn="r"/>
             <a:r>
-              <a:rPr lang="en-US" dirty="0" err="1" smtClean="0"/>
-              <a:t>Primena</a:t>
-            </a:r>
-            <a:r>
-              <a:rPr lang="en-US" dirty="0" smtClean="0"/>
-              <a:t> u angular-</a:t>
-            </a:r>
-            <a:r>
-              <a:rPr lang="en-US" sz="1200" dirty="0" smtClean="0"/>
-              <a:t>u</a:t>
-            </a:r>
-            <a:endParaRPr lang="en-US" dirty="0"/>
+              <a:rPr lang="en-US" sz="3200" dirty="0" smtClean="0"/>
+              <a:t>Karma &amp; Jasmine</a:t>
+            </a:r>
+            <a:endParaRPr lang="en-US" sz="3200" dirty="0"/>
           </a:p>
         </p:txBody>
       </p:sp>
@@ -13832,6 +13837,1224 @@
       </p:par>
     </p:tnLst>
   </p:timing>
+</p:sld>
+</file>
+
+<file path=ppt/slides/slide10.xml><?xml version="1.0" encoding="utf-8"?>
+<p:sld xmlns:a="http://schemas.openxmlformats.org/drawingml/2006/main" xmlns:r="http://schemas.openxmlformats.org/officeDocument/2006/relationships" xmlns:p="http://schemas.openxmlformats.org/presentationml/2006/main">
+  <p:cSld>
+    <p:spTree>
+      <p:nvGrpSpPr>
+        <p:cNvPr id="1" name=""/>
+        <p:cNvGrpSpPr/>
+        <p:nvPr/>
+      </p:nvGrpSpPr>
+      <p:grpSpPr>
+        <a:xfrm>
+          <a:off x="0" y="0"/>
+          <a:ext cx="0" cy="0"/>
+          <a:chOff x="0" y="0"/>
+          <a:chExt cx="0" cy="0"/>
+        </a:xfrm>
+      </p:grpSpPr>
+      <p:sp>
+        <p:nvSpPr>
+          <p:cNvPr id="2" name="Title 1"/>
+          <p:cNvSpPr>
+            <a:spLocks noGrp="1"/>
+          </p:cNvSpPr>
+          <p:nvPr>
+            <p:ph type="title"/>
+          </p:nvPr>
+        </p:nvSpPr>
+        <p:spPr>
+          <a:xfrm>
+            <a:off x="1236840" y="968861"/>
+            <a:ext cx="8761413" cy="706964"/>
+          </a:xfrm>
+        </p:spPr>
+        <p:txBody>
+          <a:bodyPr/>
+          <a:lstStyle/>
+          <a:p>
+            <a:pPr algn="ctr"/>
+            <a:r>
+              <a:rPr lang="sr-Latn-RS" dirty="0" smtClean="0"/>
+              <a:t> </a:t>
+            </a:r>
+            <a:endParaRPr lang="en-US" dirty="0"/>
+          </a:p>
+        </p:txBody>
+      </p:sp>
+      <p:sp>
+        <p:nvSpPr>
+          <p:cNvPr id="3" name="Content Placeholder 2"/>
+          <p:cNvSpPr>
+            <a:spLocks noGrp="1"/>
+          </p:cNvSpPr>
+          <p:nvPr>
+            <p:ph idx="1"/>
+          </p:nvPr>
+        </p:nvSpPr>
+        <p:spPr>
+          <a:xfrm>
+            <a:off x="475684" y="2407557"/>
+            <a:ext cx="11450157" cy="4136934"/>
+          </a:xfrm>
+        </p:spPr>
+        <p:txBody>
+          <a:bodyPr>
+            <a:normAutofit lnSpcReduction="10000"/>
+          </a:bodyPr>
+          <a:lstStyle/>
+          <a:p>
+            <a:r>
+              <a:rPr lang="sr-Latn-RS" i="1" dirty="0" smtClean="0"/>
+              <a:t>Test runner tool </a:t>
+            </a:r>
+            <a:r>
+              <a:rPr lang="sr-Latn-RS" dirty="0" smtClean="0"/>
+              <a:t>za Angular aplikacije</a:t>
+            </a:r>
+          </a:p>
+          <a:p>
+            <a:r>
+              <a:rPr lang="sr-Latn-RS" dirty="0" smtClean="0"/>
+              <a:t>Priža mogućnost da pokreće testove pisane u različitim framework-ima (</a:t>
+            </a:r>
+            <a:r>
+              <a:rPr lang="sr-Latn-RS" i="1" dirty="0" smtClean="0"/>
+              <a:t>Jasmine, Mocha, QUnit</a:t>
+            </a:r>
+            <a:r>
+              <a:rPr lang="sr-Latn-RS" dirty="0" smtClean="0"/>
+              <a:t>)</a:t>
+            </a:r>
+            <a:endParaRPr lang="en-US" dirty="0" smtClean="0"/>
+          </a:p>
+          <a:p>
+            <a:r>
+              <a:rPr lang="en-US" dirty="0" smtClean="0"/>
+              <a:t>I</a:t>
+            </a:r>
+            <a:r>
+              <a:rPr lang="sr-Latn-RS" dirty="0" smtClean="0"/>
+              <a:t>zvršavaju testove na:</a:t>
+            </a:r>
+          </a:p>
+          <a:p>
+            <a:pPr lvl="1"/>
+            <a:r>
+              <a:rPr lang="sr-Latn-RS" dirty="0" smtClean="0"/>
+              <a:t>browser-ima </a:t>
+            </a:r>
+            <a:r>
+              <a:rPr lang="sr-Latn-RS" dirty="0" smtClean="0"/>
+              <a:t>(</a:t>
+            </a:r>
+            <a:r>
+              <a:rPr lang="en-US" i="1" dirty="0"/>
+              <a:t>Chrome, Firefox, Safari, IE </a:t>
+            </a:r>
+            <a:r>
+              <a:rPr lang="en-US" dirty="0" err="1" smtClean="0"/>
+              <a:t>ili</a:t>
+            </a:r>
+            <a:r>
+              <a:rPr lang="en-US" i="1" dirty="0" smtClean="0"/>
+              <a:t> </a:t>
+            </a:r>
+            <a:r>
+              <a:rPr lang="en-US" i="1" dirty="0"/>
+              <a:t>Opera</a:t>
+            </a:r>
+            <a:r>
+              <a:rPr lang="sr-Latn-RS" dirty="0" smtClean="0"/>
+              <a:t>)</a:t>
+            </a:r>
+            <a:endParaRPr lang="sr-Latn-RS" dirty="0" smtClean="0"/>
+          </a:p>
+          <a:p>
+            <a:pPr lvl="1"/>
+            <a:r>
+              <a:rPr lang="en-US" dirty="0" smtClean="0"/>
+              <a:t>headless</a:t>
+            </a:r>
+            <a:r>
+              <a:rPr lang="en-US" dirty="0"/>
+              <a:t> </a:t>
+            </a:r>
+            <a:r>
+              <a:rPr lang="sr-Latn-RS" dirty="0" smtClean="0"/>
+              <a:t>okruženjima (</a:t>
+            </a:r>
+            <a:r>
+              <a:rPr lang="en-US" i="1" dirty="0" err="1"/>
+              <a:t>PhantomJS</a:t>
+            </a:r>
+            <a:r>
+              <a:rPr lang="sr-Latn-RS" dirty="0" smtClean="0"/>
+              <a:t>)</a:t>
+            </a:r>
+          </a:p>
+          <a:p>
+            <a:pPr lvl="1"/>
+            <a:r>
+              <a:rPr lang="sr-Latn-RS" dirty="0"/>
+              <a:t>u</a:t>
+            </a:r>
+            <a:r>
+              <a:rPr lang="sr-Latn-RS" dirty="0" smtClean="0"/>
+              <a:t>ređajima (mobilni, tableti)</a:t>
+            </a:r>
+          </a:p>
+          <a:p>
+            <a:r>
+              <a:rPr lang="sr-Latn-RS" dirty="0" smtClean="0"/>
+              <a:t>Može automatski da pokreće testove svaki put kad detektuje promeu u fajlovima</a:t>
+            </a:r>
+          </a:p>
+          <a:p>
+            <a:r>
+              <a:rPr lang="sr-Latn-RS" dirty="0" smtClean="0"/>
+              <a:t>Podržava debagovanje </a:t>
+            </a:r>
+            <a:r>
+              <a:rPr lang="sr-Latn-RS" i="1" dirty="0" smtClean="0"/>
+              <a:t>u </a:t>
+            </a:r>
+            <a:r>
+              <a:rPr lang="en-US" i="1" dirty="0"/>
+              <a:t>Google Chrome</a:t>
+            </a:r>
+            <a:r>
+              <a:rPr lang="sr-Latn-RS" i="1" dirty="0" smtClean="0"/>
+              <a:t> </a:t>
+            </a:r>
+            <a:r>
+              <a:rPr lang="sr-Latn-RS" dirty="0" smtClean="0"/>
+              <a:t>ili IDE (</a:t>
+            </a:r>
+            <a:r>
+              <a:rPr lang="sr-Latn-RS" i="1" dirty="0" smtClean="0"/>
+              <a:t>WebStorm</a:t>
+            </a:r>
+            <a:r>
+              <a:rPr lang="sr-Latn-RS" dirty="0" smtClean="0"/>
+              <a:t>)</a:t>
+            </a:r>
+          </a:p>
+          <a:p>
+            <a:r>
+              <a:rPr lang="sr-Latn-RS" dirty="0" smtClean="0"/>
+              <a:t>Interakcija: </a:t>
+            </a:r>
+          </a:p>
+          <a:p>
+            <a:pPr lvl="1"/>
+            <a:r>
+              <a:rPr lang="sr-Latn-RS" dirty="0" smtClean="0"/>
+              <a:t>Terminal (				  )</a:t>
+            </a:r>
+          </a:p>
+          <a:p>
+            <a:pPr lvl="1"/>
+            <a:r>
+              <a:rPr lang="sr-Latn-RS" dirty="0" smtClean="0"/>
+              <a:t>IDE</a:t>
+            </a:r>
+          </a:p>
+        </p:txBody>
+      </p:sp>
+      <p:pic>
+        <p:nvPicPr>
+          <p:cNvPr id="6" name="Picture 2" descr="Faster Karma test runs that work in VSTS with Chrome headless ..."/>
+          <p:cNvPicPr>
+            <a:picLocks noChangeAspect="1" noChangeArrowheads="1"/>
+          </p:cNvPicPr>
+          <p:nvPr/>
+        </p:nvPicPr>
+        <p:blipFill>
+          <a:blip r:embed="rId2">
+            <a:extLst>
+              <a:ext uri="{28A0092B-C50C-407E-A947-70E740481C1C}">
+                <a14:useLocalDpi xmlns:a14="http://schemas.microsoft.com/office/drawing/2010/main" val="0"/>
+              </a:ext>
+            </a:extLst>
+          </a:blip>
+          <a:srcRect/>
+          <a:stretch>
+            <a:fillRect/>
+          </a:stretch>
+        </p:blipFill>
+        <p:spPr bwMode="auto">
+          <a:xfrm>
+            <a:off x="3917785" y="783872"/>
+            <a:ext cx="3946814" cy="1076942"/>
+          </a:xfrm>
+          <a:prstGeom prst="rect">
+            <a:avLst/>
+          </a:prstGeom>
+          <a:noFill/>
+          <a:extLst>
+            <a:ext uri="{909E8E84-426E-40DD-AFC4-6F175D3DCCD1}">
+              <a14:hiddenFill xmlns:a14="http://schemas.microsoft.com/office/drawing/2010/main">
+                <a:solidFill>
+                  <a:srgbClr val="FFFFFF"/>
+                </a:solidFill>
+              </a14:hiddenFill>
+            </a:ext>
+          </a:extLst>
+        </p:spPr>
+      </p:pic>
+      <p:sp>
+        <p:nvSpPr>
+          <p:cNvPr id="7" name="AutoShape 4" descr="Install WebStorm for Linux using the Snap Store | Snapcraft"/>
+          <p:cNvSpPr>
+            <a:spLocks noChangeAspect="1" noChangeArrowheads="1"/>
+          </p:cNvSpPr>
+          <p:nvPr/>
+        </p:nvSpPr>
+        <p:spPr bwMode="auto">
+          <a:xfrm>
+            <a:off x="155575" y="-144463"/>
+            <a:ext cx="304800" cy="304801"/>
+          </a:xfrm>
+          <a:prstGeom prst="rect">
+            <a:avLst/>
+          </a:prstGeom>
+          <a:noFill/>
+          <a:extLst>
+            <a:ext uri="{909E8E84-426E-40DD-AFC4-6F175D3DCCD1}">
+              <a14:hiddenFill xmlns:a14="http://schemas.microsoft.com/office/drawing/2010/main">
+                <a:solidFill>
+                  <a:srgbClr val="FFFFFF"/>
+                </a:solidFill>
+              </a14:hiddenFill>
+            </a:ext>
+          </a:extLst>
+        </p:spPr>
+        <p:txBody>
+          <a:bodyPr vert="horz" wrap="square" lIns="91440" tIns="45720" rIns="91440" bIns="45720" numCol="1" anchor="t" anchorCtr="0" compatLnSpc="1">
+            <a:prstTxWarp prst="textNoShape">
+              <a:avLst/>
+            </a:prstTxWarp>
+          </a:bodyPr>
+          <a:lstStyle/>
+          <a:p>
+            <a:endParaRPr lang="en-US"/>
+          </a:p>
+        </p:txBody>
+      </p:sp>
+      <p:pic>
+        <p:nvPicPr>
+          <p:cNvPr id="1030" name="Picture 6" descr="JetBrains WebStorm (@WebStormIDE) | Twitter"/>
+          <p:cNvPicPr>
+            <a:picLocks noChangeAspect="1" noChangeArrowheads="1"/>
+          </p:cNvPicPr>
+          <p:nvPr/>
+        </p:nvPicPr>
+        <p:blipFill>
+          <a:blip r:embed="rId3">
+            <a:extLst>
+              <a:ext uri="{28A0092B-C50C-407E-A947-70E740481C1C}">
+                <a14:useLocalDpi xmlns:a14="http://schemas.microsoft.com/office/drawing/2010/main" val="0"/>
+              </a:ext>
+            </a:extLst>
+          </a:blip>
+          <a:srcRect/>
+          <a:stretch>
+            <a:fillRect/>
+          </a:stretch>
+        </p:blipFill>
+        <p:spPr bwMode="auto">
+          <a:xfrm>
+            <a:off x="10246268" y="4995547"/>
+            <a:ext cx="1679573" cy="1679573"/>
+          </a:xfrm>
+          <a:prstGeom prst="rect">
+            <a:avLst/>
+          </a:prstGeom>
+          <a:noFill/>
+          <a:extLst>
+            <a:ext uri="{909E8E84-426E-40DD-AFC4-6F175D3DCCD1}">
+              <a14:hiddenFill xmlns:a14="http://schemas.microsoft.com/office/drawing/2010/main">
+                <a:solidFill>
+                  <a:srgbClr val="FFFFFF"/>
+                </a:solidFill>
+              </a14:hiddenFill>
+            </a:ext>
+          </a:extLst>
+        </p:spPr>
+      </p:pic>
+      <p:pic>
+        <p:nvPicPr>
+          <p:cNvPr id="12" name="Picture 8" descr="Buzzvil | [Tech Blog] Scaling PhantomJS With Ghost Town"/>
+          <p:cNvPicPr>
+            <a:picLocks noChangeAspect="1" noChangeArrowheads="1"/>
+          </p:cNvPicPr>
+          <p:nvPr/>
+        </p:nvPicPr>
+        <p:blipFill>
+          <a:blip r:embed="rId4" cstate="print">
+            <a:extLst>
+              <a:ext uri="{28A0092B-C50C-407E-A947-70E740481C1C}">
+                <a14:useLocalDpi xmlns:a14="http://schemas.microsoft.com/office/drawing/2010/main" val="0"/>
+              </a:ext>
+            </a:extLst>
+          </a:blip>
+          <a:srcRect/>
+          <a:stretch>
+            <a:fillRect/>
+          </a:stretch>
+        </p:blipFill>
+        <p:spPr bwMode="auto">
+          <a:xfrm>
+            <a:off x="9946929" y="3386834"/>
+            <a:ext cx="2245071" cy="1753962"/>
+          </a:xfrm>
+          <a:prstGeom prst="rect">
+            <a:avLst/>
+          </a:prstGeom>
+          <a:noFill/>
+          <a:extLst>
+            <a:ext uri="{909E8E84-426E-40DD-AFC4-6F175D3DCCD1}">
+              <a14:hiddenFill xmlns:a14="http://schemas.microsoft.com/office/drawing/2010/main">
+                <a:solidFill>
+                  <a:srgbClr val="FFFFFF"/>
+                </a:solidFill>
+              </a14:hiddenFill>
+            </a:ext>
+          </a:extLst>
+        </p:spPr>
+      </p:pic>
+      <p:pic>
+        <p:nvPicPr>
+          <p:cNvPr id="9" name="Picture 8"/>
+          <p:cNvPicPr>
+            <a:picLocks noChangeAspect="1"/>
+          </p:cNvPicPr>
+          <p:nvPr/>
+        </p:nvPicPr>
+        <p:blipFill>
+          <a:blip r:embed="rId5"/>
+          <a:stretch>
+            <a:fillRect/>
+          </a:stretch>
+        </p:blipFill>
+        <p:spPr>
+          <a:xfrm>
+            <a:off x="2285617" y="5716254"/>
+            <a:ext cx="1562318" cy="238158"/>
+          </a:xfrm>
+          <a:prstGeom prst="rect">
+            <a:avLst/>
+          </a:prstGeom>
+        </p:spPr>
+      </p:pic>
+    </p:spTree>
+    <p:extLst>
+      <p:ext uri="{BB962C8B-B14F-4D97-AF65-F5344CB8AC3E}">
+        <p14:creationId xmlns:p14="http://schemas.microsoft.com/office/powerpoint/2010/main" val="3807163913"/>
+      </p:ext>
+    </p:extLst>
+  </p:cSld>
+  <p:clrMapOvr>
+    <a:masterClrMapping/>
+  </p:clrMapOvr>
+  <p:timing>
+    <p:tnLst>
+      <p:par>
+        <p:cTn id="1" dur="indefinite" restart="never" nodeType="tmRoot"/>
+      </p:par>
+    </p:tnLst>
+  </p:timing>
+</p:sld>
+</file>
+
+<file path=ppt/slides/slide11.xml><?xml version="1.0" encoding="utf-8"?>
+<p:sld xmlns:a="http://schemas.openxmlformats.org/drawingml/2006/main" xmlns:r="http://schemas.openxmlformats.org/officeDocument/2006/relationships" xmlns:p="http://schemas.openxmlformats.org/presentationml/2006/main">
+  <p:cSld>
+    <p:spTree>
+      <p:nvGrpSpPr>
+        <p:cNvPr id="1" name=""/>
+        <p:cNvGrpSpPr/>
+        <p:nvPr/>
+      </p:nvGrpSpPr>
+      <p:grpSpPr>
+        <a:xfrm>
+          <a:off x="0" y="0"/>
+          <a:ext cx="0" cy="0"/>
+          <a:chOff x="0" y="0"/>
+          <a:chExt cx="0" cy="0"/>
+        </a:xfrm>
+      </p:grpSpPr>
+      <p:sp>
+        <p:nvSpPr>
+          <p:cNvPr id="2" name="Title 1"/>
+          <p:cNvSpPr>
+            <a:spLocks noGrp="1"/>
+          </p:cNvSpPr>
+          <p:nvPr>
+            <p:ph type="title"/>
+          </p:nvPr>
+        </p:nvSpPr>
+        <p:spPr/>
+        <p:txBody>
+          <a:bodyPr/>
+          <a:lstStyle/>
+          <a:p>
+            <a:pPr algn="ctr"/>
+            <a:r>
+              <a:rPr lang="sr-Latn-RS" dirty="0" smtClean="0"/>
+              <a:t> </a:t>
+            </a:r>
+            <a:endParaRPr lang="en-US" dirty="0"/>
+          </a:p>
+        </p:txBody>
+      </p:sp>
+      <p:sp>
+        <p:nvSpPr>
+          <p:cNvPr id="3" name="Content Placeholder 2"/>
+          <p:cNvSpPr>
+            <a:spLocks noGrp="1"/>
+          </p:cNvSpPr>
+          <p:nvPr>
+            <p:ph idx="1"/>
+          </p:nvPr>
+        </p:nvSpPr>
+        <p:spPr>
+          <a:xfrm>
+            <a:off x="496388" y="2534194"/>
+            <a:ext cx="11181805" cy="4036423"/>
+          </a:xfrm>
+        </p:spPr>
+        <p:txBody>
+          <a:bodyPr/>
+          <a:lstStyle/>
+          <a:p>
+            <a:r>
+              <a:rPr lang="en-US" i="1" dirty="0"/>
+              <a:t>JavaScript testing </a:t>
+            </a:r>
+            <a:r>
+              <a:rPr lang="en-US" i="1" dirty="0" smtClean="0"/>
+              <a:t>framework</a:t>
+            </a:r>
+            <a:r>
+              <a:rPr lang="sr-Latn-RS" dirty="0" smtClean="0"/>
+              <a:t> koji podržava </a:t>
+            </a:r>
+            <a:r>
+              <a:rPr lang="sr-Latn-RS" i="1" dirty="0" smtClean="0"/>
+              <a:t>Behaviour-Driven Development (BDD)</a:t>
+            </a:r>
+          </a:p>
+          <a:p>
+            <a:r>
+              <a:rPr lang="sr-Latn-RS" dirty="0" smtClean="0"/>
+              <a:t>Podržava testiranje za Frontend i Backend</a:t>
+            </a:r>
+          </a:p>
+          <a:p>
+            <a:r>
+              <a:rPr lang="sr-Latn-RS" dirty="0" smtClean="0"/>
+              <a:t>Ne zahteva DOM</a:t>
+            </a:r>
+          </a:p>
+          <a:p>
+            <a:r>
+              <a:rPr lang="sr-Latn-RS" dirty="0" smtClean="0"/>
+              <a:t>Jednostavna sintaksa</a:t>
+            </a:r>
+          </a:p>
+          <a:p>
+            <a:r>
+              <a:rPr lang="sr-Latn-RS" dirty="0" smtClean="0"/>
+              <a:t>Nema test runner </a:t>
+            </a:r>
+          </a:p>
+          <a:p>
+            <a:endParaRPr lang="en-US" dirty="0"/>
+          </a:p>
+        </p:txBody>
+      </p:sp>
+      <p:pic>
+        <p:nvPicPr>
+          <p:cNvPr id="12" name="Picture 11"/>
+          <p:cNvPicPr>
+            <a:picLocks noChangeAspect="1"/>
+          </p:cNvPicPr>
+          <p:nvPr/>
+        </p:nvPicPr>
+        <p:blipFill>
+          <a:blip r:embed="rId2">
+            <a:extLst>
+              <a:ext uri="{28A0092B-C50C-407E-A947-70E740481C1C}">
+                <a14:useLocalDpi xmlns:a14="http://schemas.microsoft.com/office/drawing/2010/main" val="0"/>
+              </a:ext>
+            </a:extLst>
+          </a:blip>
+          <a:stretch>
+            <a:fillRect/>
+          </a:stretch>
+        </p:blipFill>
+        <p:spPr>
+          <a:xfrm>
+            <a:off x="3838842" y="826352"/>
+            <a:ext cx="4011935" cy="1096319"/>
+          </a:xfrm>
+          <a:prstGeom prst="rect">
+            <a:avLst/>
+          </a:prstGeom>
+        </p:spPr>
+      </p:pic>
+      <p:pic>
+        <p:nvPicPr>
+          <p:cNvPr id="13" name="Picture 12"/>
+          <p:cNvPicPr>
+            <a:picLocks noChangeAspect="1"/>
+          </p:cNvPicPr>
+          <p:nvPr/>
+        </p:nvPicPr>
+        <p:blipFill>
+          <a:blip r:embed="rId3"/>
+          <a:stretch>
+            <a:fillRect/>
+          </a:stretch>
+        </p:blipFill>
+        <p:spPr>
+          <a:xfrm>
+            <a:off x="4840072" y="4035699"/>
+            <a:ext cx="6021410" cy="1868713"/>
+          </a:xfrm>
+          <a:prstGeom prst="rect">
+            <a:avLst/>
+          </a:prstGeom>
+        </p:spPr>
+      </p:pic>
+    </p:spTree>
+    <p:extLst>
+      <p:ext uri="{BB962C8B-B14F-4D97-AF65-F5344CB8AC3E}">
+        <p14:creationId xmlns:p14="http://schemas.microsoft.com/office/powerpoint/2010/main" val="2079934294"/>
+      </p:ext>
+    </p:extLst>
+  </p:cSld>
+  <p:clrMapOvr>
+    <a:masterClrMapping/>
+  </p:clrMapOvr>
+  <p:timing>
+    <p:tnLst>
+      <p:par>
+        <p:cTn id="1" dur="indefinite" restart="never" nodeType="tmRoot"/>
+      </p:par>
+    </p:tnLst>
+  </p:timing>
+</p:sld>
+</file>
+
+<file path=ppt/slides/slide12.xml><?xml version="1.0" encoding="utf-8"?>
+<p:sld xmlns:a="http://schemas.openxmlformats.org/drawingml/2006/main" xmlns:r="http://schemas.openxmlformats.org/officeDocument/2006/relationships" xmlns:p="http://schemas.openxmlformats.org/presentationml/2006/main">
+  <p:cSld>
+    <p:spTree>
+      <p:nvGrpSpPr>
+        <p:cNvPr id="1" name=""/>
+        <p:cNvGrpSpPr/>
+        <p:nvPr/>
+      </p:nvGrpSpPr>
+      <p:grpSpPr>
+        <a:xfrm>
+          <a:off x="0" y="0"/>
+          <a:ext cx="0" cy="0"/>
+          <a:chOff x="0" y="0"/>
+          <a:chExt cx="0" cy="0"/>
+        </a:xfrm>
+      </p:grpSpPr>
+      <p:sp>
+        <p:nvSpPr>
+          <p:cNvPr id="2" name="Title 1"/>
+          <p:cNvSpPr>
+            <a:spLocks noGrp="1"/>
+          </p:cNvSpPr>
+          <p:nvPr>
+            <p:ph type="title"/>
+          </p:nvPr>
+        </p:nvSpPr>
+        <p:spPr/>
+        <p:txBody>
+          <a:bodyPr/>
+          <a:lstStyle/>
+          <a:p>
+            <a:pPr algn="ctr"/>
+            <a:r>
+              <a:rPr lang="sr-Latn-RS" dirty="0" smtClean="0"/>
+              <a:t>Angular - </a:t>
+            </a:r>
+            <a:r>
+              <a:rPr lang="en-US" dirty="0" smtClean="0"/>
+              <a:t>Karma </a:t>
+            </a:r>
+            <a:r>
+              <a:rPr lang="sr-Latn-RS" dirty="0"/>
+              <a:t>&amp;</a:t>
+            </a:r>
+            <a:r>
+              <a:rPr lang="en-US" dirty="0" smtClean="0"/>
+              <a:t> Jasmine</a:t>
+            </a:r>
+            <a:endParaRPr lang="en-US" dirty="0"/>
+          </a:p>
+        </p:txBody>
+      </p:sp>
+      <p:sp>
+        <p:nvSpPr>
+          <p:cNvPr id="3" name="Content Placeholder 2"/>
+          <p:cNvSpPr>
+            <a:spLocks noGrp="1"/>
+          </p:cNvSpPr>
+          <p:nvPr>
+            <p:ph idx="1"/>
+          </p:nvPr>
+        </p:nvSpPr>
+        <p:spPr>
+          <a:xfrm>
+            <a:off x="527937" y="2394494"/>
+            <a:ext cx="11124132" cy="4123872"/>
+          </a:xfrm>
+        </p:spPr>
+        <p:txBody>
+          <a:bodyPr/>
+          <a:lstStyle/>
+          <a:p>
+            <a:r>
+              <a:rPr lang="en-US" dirty="0"/>
+              <a:t>Angular </a:t>
+            </a:r>
+            <a:r>
+              <a:rPr lang="en-US" dirty="0" smtClean="0"/>
+              <a:t>CLI</a:t>
+            </a:r>
+          </a:p>
+          <a:p>
+            <a:endParaRPr lang="en-US" dirty="0"/>
+          </a:p>
+          <a:p>
+            <a:endParaRPr lang="en-US" dirty="0" smtClean="0"/>
+          </a:p>
+          <a:p>
+            <a:r>
+              <a:rPr lang="en-US" dirty="0" err="1" smtClean="0"/>
+              <a:t>Pokretanje</a:t>
+            </a:r>
+            <a:r>
+              <a:rPr lang="en-US" dirty="0" smtClean="0"/>
+              <a:t> </a:t>
+            </a:r>
+            <a:r>
+              <a:rPr lang="en-US" dirty="0" err="1" smtClean="0"/>
+              <a:t>testova</a:t>
+            </a:r>
+            <a:endParaRPr lang="en-US" dirty="0" smtClean="0"/>
+          </a:p>
+          <a:p>
+            <a:endParaRPr lang="en-US" dirty="0" smtClean="0"/>
+          </a:p>
+          <a:p>
+            <a:endParaRPr lang="en-US" dirty="0"/>
+          </a:p>
+          <a:p>
+            <a:endParaRPr lang="en-US" dirty="0"/>
+          </a:p>
+        </p:txBody>
+      </p:sp>
+      <p:pic>
+        <p:nvPicPr>
+          <p:cNvPr id="5" name="Picture 4"/>
+          <p:cNvPicPr>
+            <a:picLocks noChangeAspect="1"/>
+          </p:cNvPicPr>
+          <p:nvPr/>
+        </p:nvPicPr>
+        <p:blipFill>
+          <a:blip r:embed="rId2"/>
+          <a:stretch>
+            <a:fillRect/>
+          </a:stretch>
+        </p:blipFill>
+        <p:spPr>
+          <a:xfrm>
+            <a:off x="5235445" y="2303945"/>
+            <a:ext cx="6555019" cy="4304970"/>
+          </a:xfrm>
+          <a:prstGeom prst="rect">
+            <a:avLst/>
+          </a:prstGeom>
+        </p:spPr>
+      </p:pic>
+      <p:pic>
+        <p:nvPicPr>
+          <p:cNvPr id="6" name="Picture 5"/>
+          <p:cNvPicPr>
+            <a:picLocks noChangeAspect="1"/>
+          </p:cNvPicPr>
+          <p:nvPr/>
+        </p:nvPicPr>
+        <p:blipFill>
+          <a:blip r:embed="rId3"/>
+          <a:stretch>
+            <a:fillRect/>
+          </a:stretch>
+        </p:blipFill>
+        <p:spPr>
+          <a:xfrm>
+            <a:off x="972707" y="2850770"/>
+            <a:ext cx="3286417" cy="567125"/>
+          </a:xfrm>
+          <a:prstGeom prst="rect">
+            <a:avLst/>
+          </a:prstGeom>
+        </p:spPr>
+      </p:pic>
+      <p:pic>
+        <p:nvPicPr>
+          <p:cNvPr id="7" name="Picture 6"/>
+          <p:cNvPicPr>
+            <a:picLocks noChangeAspect="1"/>
+          </p:cNvPicPr>
+          <p:nvPr/>
+        </p:nvPicPr>
+        <p:blipFill>
+          <a:blip r:embed="rId4"/>
+          <a:stretch>
+            <a:fillRect/>
+          </a:stretch>
+        </p:blipFill>
+        <p:spPr>
+          <a:xfrm>
+            <a:off x="972706" y="4017440"/>
+            <a:ext cx="3339513" cy="280239"/>
+          </a:xfrm>
+          <a:prstGeom prst="rect">
+            <a:avLst/>
+          </a:prstGeom>
+        </p:spPr>
+      </p:pic>
+    </p:spTree>
+    <p:extLst>
+      <p:ext uri="{BB962C8B-B14F-4D97-AF65-F5344CB8AC3E}">
+        <p14:creationId xmlns:p14="http://schemas.microsoft.com/office/powerpoint/2010/main" val="4079946224"/>
+      </p:ext>
+    </p:extLst>
+  </p:cSld>
+  <p:clrMapOvr>
+    <a:masterClrMapping/>
+  </p:clrMapOvr>
+  <p:timing>
+    <p:tnLst>
+      <p:par>
+        <p:cTn id="1" dur="indefinite" restart="never" nodeType="tmRoot"/>
+      </p:par>
+    </p:tnLst>
+  </p:timing>
+</p:sld>
+</file>
+
+<file path=ppt/slides/slide13.xml><?xml version="1.0" encoding="utf-8"?>
+<p:sld xmlns:a="http://schemas.openxmlformats.org/drawingml/2006/main" xmlns:r="http://schemas.openxmlformats.org/officeDocument/2006/relationships" xmlns:p="http://schemas.openxmlformats.org/presentationml/2006/main">
+  <p:cSld>
+    <p:spTree>
+      <p:nvGrpSpPr>
+        <p:cNvPr id="1" name=""/>
+        <p:cNvGrpSpPr/>
+        <p:nvPr/>
+      </p:nvGrpSpPr>
+      <p:grpSpPr>
+        <a:xfrm>
+          <a:off x="0" y="0"/>
+          <a:ext cx="0" cy="0"/>
+          <a:chOff x="0" y="0"/>
+          <a:chExt cx="0" cy="0"/>
+        </a:xfrm>
+      </p:grpSpPr>
+      <p:sp>
+        <p:nvSpPr>
+          <p:cNvPr id="3" name="Content Placeholder 2"/>
+          <p:cNvSpPr>
+            <a:spLocks noGrp="1"/>
+          </p:cNvSpPr>
+          <p:nvPr>
+            <p:ph sz="half" idx="4294967295"/>
+          </p:nvPr>
+        </p:nvSpPr>
+        <p:spPr>
+          <a:xfrm>
+            <a:off x="5839876" y="483326"/>
+            <a:ext cx="6073449" cy="5997479"/>
+          </a:xfrm>
+        </p:spPr>
+        <p:txBody>
+          <a:bodyPr/>
+          <a:lstStyle/>
+          <a:p>
+            <a:endParaRPr lang="en-US" dirty="0" smtClean="0"/>
+          </a:p>
+          <a:p>
+            <a:endParaRPr lang="en-US" dirty="0"/>
+          </a:p>
+          <a:p>
+            <a:endParaRPr lang="en-US" dirty="0" smtClean="0"/>
+          </a:p>
+          <a:p>
+            <a:endParaRPr lang="en-US" dirty="0" smtClean="0"/>
+          </a:p>
+          <a:p>
+            <a:endParaRPr lang="en-US" dirty="0"/>
+          </a:p>
+        </p:txBody>
+      </p:sp>
+      <p:sp>
+        <p:nvSpPr>
+          <p:cNvPr id="10" name="Content Placeholder 9"/>
+          <p:cNvSpPr>
+            <a:spLocks noGrp="1"/>
+          </p:cNvSpPr>
+          <p:nvPr>
+            <p:ph sz="half" idx="4294967295"/>
+          </p:nvPr>
+        </p:nvSpPr>
+        <p:spPr>
+          <a:xfrm>
+            <a:off x="2658311" y="146045"/>
+            <a:ext cx="6363129" cy="6436909"/>
+          </a:xfrm>
+        </p:spPr>
+        <p:txBody>
+          <a:bodyPr/>
+          <a:lstStyle/>
+          <a:p>
+            <a:pPr marL="0" indent="0" algn="ctr">
+              <a:buNone/>
+            </a:pPr>
+            <a:r>
+              <a:rPr lang="en-US" sz="2400" dirty="0" err="1"/>
+              <a:t>p</a:t>
+            </a:r>
+            <a:r>
+              <a:rPr lang="en-US" sz="2400" dirty="0" err="1" smtClean="0"/>
+              <a:t>ackage.json</a:t>
+            </a:r>
+            <a:endParaRPr lang="en-US" sz="2400" dirty="0" smtClean="0"/>
+          </a:p>
+          <a:p>
+            <a:endParaRPr lang="en-US" dirty="0"/>
+          </a:p>
+        </p:txBody>
+      </p:sp>
+      <p:pic>
+        <p:nvPicPr>
+          <p:cNvPr id="11" name="Picture 10"/>
+          <p:cNvPicPr>
+            <a:picLocks noChangeAspect="1"/>
+          </p:cNvPicPr>
+          <p:nvPr/>
+        </p:nvPicPr>
+        <p:blipFill>
+          <a:blip r:embed="rId2"/>
+          <a:stretch>
+            <a:fillRect/>
+          </a:stretch>
+        </p:blipFill>
+        <p:spPr>
+          <a:xfrm>
+            <a:off x="3018386" y="666011"/>
+            <a:ext cx="5858214" cy="5916943"/>
+          </a:xfrm>
+          <a:prstGeom prst="rect">
+            <a:avLst/>
+          </a:prstGeom>
+        </p:spPr>
+      </p:pic>
+    </p:spTree>
+    <p:extLst>
+      <p:ext uri="{BB962C8B-B14F-4D97-AF65-F5344CB8AC3E}">
+        <p14:creationId xmlns:p14="http://schemas.microsoft.com/office/powerpoint/2010/main" val="2896372607"/>
+      </p:ext>
+    </p:extLst>
+  </p:cSld>
+  <p:clrMapOvr>
+    <a:masterClrMapping/>
+  </p:clrMapOvr>
+  <p:timing>
+    <p:tnLst>
+      <p:par>
+        <p:cTn id="1" dur="indefinite" restart="never" nodeType="tmRoot"/>
+      </p:par>
+    </p:tnLst>
+  </p:timing>
+</p:sld>
+</file>
+
+<file path=ppt/slides/slide14.xml><?xml version="1.0" encoding="utf-8"?>
+<p:sld xmlns:a="http://schemas.openxmlformats.org/drawingml/2006/main" xmlns:r="http://schemas.openxmlformats.org/officeDocument/2006/relationships" xmlns:p="http://schemas.openxmlformats.org/presentationml/2006/main">
+  <p:cSld>
+    <p:spTree>
+      <p:nvGrpSpPr>
+        <p:cNvPr id="1" name=""/>
+        <p:cNvGrpSpPr/>
+        <p:nvPr/>
+      </p:nvGrpSpPr>
+      <p:grpSpPr>
+        <a:xfrm>
+          <a:off x="0" y="0"/>
+          <a:ext cx="0" cy="0"/>
+          <a:chOff x="0" y="0"/>
+          <a:chExt cx="0" cy="0"/>
+        </a:xfrm>
+      </p:grpSpPr>
+      <p:pic>
+        <p:nvPicPr>
+          <p:cNvPr id="2" name="Picture 1"/>
+          <p:cNvPicPr>
+            <a:picLocks noChangeAspect="1"/>
+          </p:cNvPicPr>
+          <p:nvPr/>
+        </p:nvPicPr>
+        <p:blipFill>
+          <a:blip r:embed="rId2"/>
+          <a:stretch>
+            <a:fillRect/>
+          </a:stretch>
+        </p:blipFill>
+        <p:spPr>
+          <a:xfrm>
+            <a:off x="2792768" y="822767"/>
+            <a:ext cx="6155289" cy="5893321"/>
+          </a:xfrm>
+          <a:prstGeom prst="rect">
+            <a:avLst/>
+          </a:prstGeom>
+        </p:spPr>
+      </p:pic>
+      <p:sp>
+        <p:nvSpPr>
+          <p:cNvPr id="3" name="TextBox 2"/>
+          <p:cNvSpPr txBox="1"/>
+          <p:nvPr/>
+        </p:nvSpPr>
+        <p:spPr>
+          <a:xfrm>
+            <a:off x="4447757" y="195943"/>
+            <a:ext cx="2444900" cy="461665"/>
+          </a:xfrm>
+          <a:prstGeom prst="rect">
+            <a:avLst/>
+          </a:prstGeom>
+          <a:noFill/>
+        </p:spPr>
+        <p:txBody>
+          <a:bodyPr wrap="none" rtlCol="0">
+            <a:spAutoFit/>
+          </a:bodyPr>
+          <a:lstStyle/>
+          <a:p>
+            <a:r>
+              <a:rPr lang="en-US" sz="2400" dirty="0" smtClean="0"/>
+              <a:t>karma.config.js</a:t>
+            </a:r>
+            <a:endParaRPr lang="en-US" sz="2400" dirty="0"/>
+          </a:p>
+        </p:txBody>
+      </p:sp>
+    </p:spTree>
+    <p:extLst>
+      <p:ext uri="{BB962C8B-B14F-4D97-AF65-F5344CB8AC3E}">
+        <p14:creationId xmlns:p14="http://schemas.microsoft.com/office/powerpoint/2010/main" val="3781607857"/>
+      </p:ext>
+    </p:extLst>
+  </p:cSld>
+  <p:clrMapOvr>
+    <a:masterClrMapping/>
+  </p:clrMapOvr>
+  <p:timing>
+    <p:tnLst>
+      <p:par>
+        <p:cTn id="1" dur="indefinite" restart="never" nodeType="tmRoot"/>
+      </p:par>
+    </p:tnLst>
+  </p:timing>
+</p:sld>
+</file>
+
+<file path=ppt/slides/slide15.xml><?xml version="1.0" encoding="utf-8"?>
+<p:sld xmlns:a="http://schemas.openxmlformats.org/drawingml/2006/main" xmlns:r="http://schemas.openxmlformats.org/officeDocument/2006/relationships" xmlns:p="http://schemas.openxmlformats.org/presentationml/2006/main">
+  <p:cSld>
+    <p:spTree>
+      <p:nvGrpSpPr>
+        <p:cNvPr id="1" name=""/>
+        <p:cNvGrpSpPr/>
+        <p:nvPr/>
+      </p:nvGrpSpPr>
+      <p:grpSpPr>
+        <a:xfrm>
+          <a:off x="0" y="0"/>
+          <a:ext cx="0" cy="0"/>
+          <a:chOff x="0" y="0"/>
+          <a:chExt cx="0" cy="0"/>
+        </a:xfrm>
+      </p:grpSpPr>
+      <p:pic>
+        <p:nvPicPr>
+          <p:cNvPr id="2" name="Picture 1"/>
+          <p:cNvPicPr>
+            <a:picLocks noChangeAspect="1"/>
+          </p:cNvPicPr>
+          <p:nvPr/>
+        </p:nvPicPr>
+        <p:blipFill>
+          <a:blip r:embed="rId2"/>
+          <a:stretch>
+            <a:fillRect/>
+          </a:stretch>
+        </p:blipFill>
+        <p:spPr>
+          <a:xfrm>
+            <a:off x="2623150" y="769944"/>
+            <a:ext cx="6559898" cy="5922499"/>
+          </a:xfrm>
+          <a:prstGeom prst="rect">
+            <a:avLst/>
+          </a:prstGeom>
+        </p:spPr>
+      </p:pic>
+      <p:sp>
+        <p:nvSpPr>
+          <p:cNvPr id="3" name="Rectangle 2"/>
+          <p:cNvSpPr/>
+          <p:nvPr/>
+        </p:nvSpPr>
+        <p:spPr>
+          <a:xfrm>
+            <a:off x="4880062" y="203776"/>
+            <a:ext cx="1023037" cy="461665"/>
+          </a:xfrm>
+          <a:prstGeom prst="rect">
+            <a:avLst/>
+          </a:prstGeom>
+        </p:spPr>
+        <p:txBody>
+          <a:bodyPr wrap="none">
+            <a:spAutoFit/>
+          </a:bodyPr>
+          <a:lstStyle/>
+          <a:p>
+            <a:pPr algn="ctr"/>
+            <a:r>
+              <a:rPr lang="en-US" sz="2400" dirty="0" err="1"/>
+              <a:t>t</a:t>
+            </a:r>
+            <a:r>
+              <a:rPr lang="en-US" sz="2400" dirty="0" err="1" smtClean="0"/>
+              <a:t>est.ts</a:t>
+            </a:r>
+            <a:endParaRPr lang="en-US" sz="2400" dirty="0"/>
+          </a:p>
+        </p:txBody>
+      </p:sp>
+    </p:spTree>
+    <p:extLst>
+      <p:ext uri="{BB962C8B-B14F-4D97-AF65-F5344CB8AC3E}">
+        <p14:creationId xmlns:p14="http://schemas.microsoft.com/office/powerpoint/2010/main" val="2378359277"/>
+      </p:ext>
+    </p:extLst>
+  </p:cSld>
+  <p:clrMapOvr>
+    <a:masterClrMapping/>
+  </p:clrMapOvr>
+  <p:timing>
+    <p:tnLst>
+      <p:par>
+        <p:cTn id="1" dur="indefinite" restart="never" nodeType="tmRoot"/>
+      </p:par>
+    </p:tnLst>
+  </p:timing>
+</p:sld>
+</file>
+
+<file path=ppt/slides/slide16.xml><?xml version="1.0" encoding="utf-8"?>
+<p:sld xmlns:a="http://schemas.openxmlformats.org/drawingml/2006/main" xmlns:r="http://schemas.openxmlformats.org/officeDocument/2006/relationships" xmlns:p="http://schemas.openxmlformats.org/presentationml/2006/main">
+  <p:cSld>
+    <p:spTree>
+      <p:nvGrpSpPr>
+        <p:cNvPr id="1" name=""/>
+        <p:cNvGrpSpPr/>
+        <p:nvPr/>
+      </p:nvGrpSpPr>
+      <p:grpSpPr>
+        <a:xfrm>
+          <a:off x="0" y="0"/>
+          <a:ext cx="0" cy="0"/>
+          <a:chOff x="0" y="0"/>
+          <a:chExt cx="0" cy="0"/>
+        </a:xfrm>
+      </p:grpSpPr>
+      <p:pic>
+        <p:nvPicPr>
+          <p:cNvPr id="2" name="Picture 1"/>
+          <p:cNvPicPr>
+            <a:picLocks noChangeAspect="1"/>
+          </p:cNvPicPr>
+          <p:nvPr/>
+        </p:nvPicPr>
+        <p:blipFill>
+          <a:blip r:embed="rId2"/>
+          <a:stretch>
+            <a:fillRect/>
+          </a:stretch>
+        </p:blipFill>
+        <p:spPr>
+          <a:xfrm>
+            <a:off x="4349931" y="1280159"/>
+            <a:ext cx="6531430" cy="5306787"/>
+          </a:xfrm>
+          <a:prstGeom prst="rect">
+            <a:avLst/>
+          </a:prstGeom>
+        </p:spPr>
+      </p:pic>
+      <p:pic>
+        <p:nvPicPr>
+          <p:cNvPr id="6" name="Picture 5"/>
+          <p:cNvPicPr>
+            <a:picLocks noChangeAspect="1"/>
+          </p:cNvPicPr>
+          <p:nvPr/>
+        </p:nvPicPr>
+        <p:blipFill>
+          <a:blip r:embed="rId3"/>
+          <a:stretch>
+            <a:fillRect/>
+          </a:stretch>
+        </p:blipFill>
+        <p:spPr>
+          <a:xfrm>
+            <a:off x="680221" y="1280159"/>
+            <a:ext cx="3228975" cy="1704975"/>
+          </a:xfrm>
+          <a:prstGeom prst="rect">
+            <a:avLst/>
+          </a:prstGeom>
+        </p:spPr>
+      </p:pic>
+    </p:spTree>
+    <p:extLst>
+      <p:ext uri="{BB962C8B-B14F-4D97-AF65-F5344CB8AC3E}">
+        <p14:creationId xmlns:p14="http://schemas.microsoft.com/office/powerpoint/2010/main" val="1453019555"/>
+      </p:ext>
+    </p:extLst>
+  </p:cSld>
+  <p:clrMapOvr>
+    <a:masterClrMapping/>
+  </p:clrMapOvr>
 </p:sld>
 </file>
 
@@ -13925,36 +15148,56 @@
           <a:p>
             <a:pPr lvl="1"/>
             <a:r>
+              <a:rPr lang="sr-Latn-RS" dirty="0"/>
+              <a:t>s</a:t>
+            </a:r>
+            <a:r>
               <a:rPr lang="sr-Latn-RS" dirty="0" smtClean="0"/>
-              <a:t>Smanjuju broj bagova u novim i postojećim funkcionalnostima</a:t>
+              <a:t>manjuju broj bagova u novim i postojećim funkcionalnostima</a:t>
             </a:r>
           </a:p>
           <a:p>
             <a:pPr lvl="1"/>
             <a:r>
+              <a:rPr lang="sr-Latn-RS" dirty="0"/>
+              <a:t>s</a:t>
+            </a:r>
+            <a:r>
               <a:rPr lang="sr-Latn-RS" dirty="0" smtClean="0"/>
-              <a:t>Smanjuju cenu pravljenja izmena</a:t>
+              <a:t>manjuju cenu pravljenja izmena</a:t>
             </a:r>
           </a:p>
           <a:p>
             <a:pPr lvl="1"/>
             <a:r>
+              <a:rPr lang="sr-Latn-RS" dirty="0"/>
+              <a:t>u</a:t>
+            </a:r>
+            <a:r>
               <a:rPr lang="sr-Latn-RS" dirty="0" smtClean="0"/>
-              <a:t>Unapređuju arhitekturu rešenja</a:t>
+              <a:t>napređuju arhitekturu rešenja</a:t>
             </a:r>
           </a:p>
           <a:p>
             <a:pPr lvl="1"/>
             <a:r>
+              <a:rPr lang="sr-Latn-RS" dirty="0"/>
+              <a:t>o</a:t>
+            </a:r>
+            <a:r>
               <a:rPr lang="sr-Latn-RS" dirty="0" smtClean="0"/>
-              <a:t>Olakšavaju refaktorisanje</a:t>
+              <a:t>lakšavaju refaktorisanje</a:t>
             </a:r>
           </a:p>
           <a:p>
             <a:pPr lvl="1"/>
             <a:r>
+              <a:rPr lang="sr-Latn-RS" dirty="0"/>
+              <a:t>u</a:t>
+            </a:r>
+            <a:r>
               <a:rPr lang="sr-Latn-RS" dirty="0" smtClean="0"/>
-              <a:t>Ubrzavaju razvoj</a:t>
+              <a:t>brzavaju razvoj</a:t>
             </a:r>
             <a:endParaRPr lang="en-US" dirty="0"/>
           </a:p>
@@ -14348,8 +15591,12 @@
           <a:p>
             <a:pPr lvl="1"/>
             <a:r>
+              <a:rPr lang="sr-Latn-RS" dirty="0" err="1"/>
+              <a:t>p</a:t>
+            </a:r>
+            <a:r>
               <a:rPr lang="en-US" dirty="0" err="1" smtClean="0"/>
-              <a:t>Pokrivenost</a:t>
+              <a:t>okrivenost</a:t>
             </a:r>
             <a:r>
               <a:rPr lang="en-US" dirty="0" smtClean="0"/>
@@ -14376,8 +15623,12 @@
           <a:p>
             <a:pPr lvl="1"/>
             <a:r>
+              <a:rPr lang="sr-Latn-RS" dirty="0" err="1"/>
+              <a:t>p</a:t>
+            </a:r>
+            <a:r>
               <a:rPr lang="en-US" dirty="0" err="1" smtClean="0"/>
-              <a:t>Pokrivenost</a:t>
+              <a:t>okrivenost</a:t>
             </a:r>
             <a:r>
               <a:rPr lang="en-US" dirty="0" smtClean="0"/>
@@ -14404,8 +15655,12 @@
           <a:p>
             <a:pPr lvl="1"/>
             <a:r>
+              <a:rPr lang="sr-Latn-RS" dirty="0" err="1"/>
+              <a:t>p</a:t>
+            </a:r>
+            <a:r>
               <a:rPr lang="en-US" dirty="0" err="1" smtClean="0"/>
-              <a:t>Pokrivenost</a:t>
+              <a:t>okrivenost</a:t>
             </a:r>
             <a:r>
               <a:rPr lang="en-US" dirty="0" smtClean="0"/>
@@ -14472,8 +15727,12 @@
           <a:p>
             <a:pPr lvl="1"/>
             <a:r>
+              <a:rPr lang="sr-Latn-RS" dirty="0"/>
+              <a:t>p</a:t>
+            </a:r>
+            <a:r>
               <a:rPr lang="sr-Latn-RS" dirty="0" smtClean="0"/>
-              <a:t>Pokrivenost uslova </a:t>
+              <a:t>okrivenost uslova </a:t>
             </a:r>
             <a:r>
               <a:rPr lang="it-IT" i="1" dirty="0"/>
@@ -15383,6 +16642,40 @@
 <file path=ppt/slides/slide7.xml><?xml version="1.0" encoding="utf-8"?>
 <p:sld xmlns:a="http://schemas.openxmlformats.org/drawingml/2006/main" xmlns:r="http://schemas.openxmlformats.org/officeDocument/2006/relationships" xmlns:p="http://schemas.openxmlformats.org/presentationml/2006/main">
   <p:cSld>
+    <p:bg>
+      <p:bgPr>
+        <a:gradFill>
+          <a:gsLst>
+            <a:gs pos="0">
+              <a:schemeClr val="accent1">
+                <a:lumMod val="5000"/>
+                <a:lumOff val="95000"/>
+              </a:schemeClr>
+            </a:gs>
+            <a:gs pos="74000">
+              <a:schemeClr val="accent1">
+                <a:lumMod val="45000"/>
+                <a:lumOff val="55000"/>
+              </a:schemeClr>
+            </a:gs>
+            <a:gs pos="83000">
+              <a:schemeClr val="accent1">
+                <a:lumMod val="45000"/>
+                <a:lumOff val="55000"/>
+              </a:schemeClr>
+            </a:gs>
+            <a:gs pos="100000">
+              <a:schemeClr val="accent1">
+                <a:lumMod val="30000"/>
+                <a:lumOff val="70000"/>
+              </a:schemeClr>
+            </a:gs>
+          </a:gsLst>
+          <a:lin ang="5400000" scaled="1"/>
+        </a:gradFill>
+        <a:effectLst/>
+      </p:bgPr>
+    </p:bg>
     <p:spTree>
       <p:nvGrpSpPr>
         <p:cNvPr id="1" name=""/>
@@ -15821,7 +17114,7 @@
         </p:blipFill>
         <p:spPr>
           <a:xfrm>
-            <a:off x="10117454" y="475906"/>
+            <a:off x="10039076" y="475906"/>
             <a:ext cx="1547677" cy="1541486"/>
           </a:xfrm>
           <a:prstGeom prst="rect">
@@ -15932,7 +17225,6 @@
               <a:rPr lang="sr-Latn-RS" dirty="0" smtClean="0"/>
               <a:t>šavaju kvalitet koda</a:t>
             </a:r>
-            <a:endParaRPr lang="sr-Latn-RS" dirty="0" smtClean="0"/>
           </a:p>
           <a:p>
             <a:pPr>
@@ -15993,7 +17285,6 @@
               <a:rPr lang="sr-Latn-RS" dirty="0" smtClean="0"/>
               <a:t>Smanjuju troškove ispravljanja grešaka u kodu</a:t>
             </a:r>
-            <a:endParaRPr lang="sr-Latn-RS" dirty="0" smtClean="0"/>
           </a:p>
           <a:p>
             <a:endParaRPr lang="en-US" dirty="0"/>
@@ -16095,7 +17386,15 @@
           <a:p>
             <a:pPr algn="ctr"/>
             <a:r>
-              <a:rPr lang="sr-Latn-RS" dirty="0"/>
+              <a:rPr lang="sr-Latn-RS" dirty="0" smtClean="0"/>
+              <a:t>Angular </a:t>
+            </a:r>
+            <a:r>
+              <a:rPr lang="en-US" dirty="0" smtClean="0"/>
+              <a:t>- </a:t>
+            </a:r>
+            <a:r>
+              <a:rPr lang="sr-Latn-RS" dirty="0" smtClean="0"/>
               <a:t>U</a:t>
             </a:r>
             <a:r>
@@ -16103,37 +17402,262 @@
               <a:t>nit </a:t>
             </a:r>
             <a:r>
-              <a:rPr lang="en-US" dirty="0"/>
-              <a:t>testing frameworks</a:t>
+              <a:rPr lang="sr-Latn-RS" dirty="0" smtClean="0"/>
+              <a:t>T</a:t>
+            </a:r>
+            <a:r>
+              <a:rPr lang="en-US" dirty="0" err="1" smtClean="0"/>
+              <a:t>esting</a:t>
+            </a:r>
+            <a:r>
+              <a:rPr lang="en-US" dirty="0" smtClean="0"/>
+              <a:t> </a:t>
+            </a:r>
+            <a:r>
+              <a:rPr lang="sr-Latn-RS" dirty="0"/>
+              <a:t>F</a:t>
+            </a:r>
+            <a:r>
+              <a:rPr lang="en-US" dirty="0" err="1" smtClean="0"/>
+              <a:t>rameworks</a:t>
             </a:r>
             <a:endParaRPr lang="en-US" dirty="0"/>
           </a:p>
         </p:txBody>
       </p:sp>
-      <p:sp>
-        <p:nvSpPr>
-          <p:cNvPr id="3" name="Content Placeholder 2"/>
-          <p:cNvSpPr>
-            <a:spLocks noGrp="1"/>
-          </p:cNvSpPr>
-          <p:nvPr>
-            <p:ph idx="1"/>
-          </p:nvPr>
-        </p:nvSpPr>
+      <p:pic>
+        <p:nvPicPr>
+          <p:cNvPr id="5" name="Picture 4"/>
+          <p:cNvPicPr>
+            <a:picLocks noChangeAspect="1"/>
+          </p:cNvPicPr>
+          <p:nvPr/>
+        </p:nvPicPr>
+        <p:blipFill>
+          <a:blip r:embed="rId2"/>
+          <a:stretch>
+            <a:fillRect/>
+          </a:stretch>
+        </p:blipFill>
         <p:spPr>
           <a:xfrm>
-            <a:off x="509451" y="2442754"/>
-            <a:ext cx="11207931" cy="3577046"/>
+            <a:off x="10352025" y="475906"/>
+            <a:ext cx="921780" cy="995524"/>
           </a:xfrm>
+          <a:prstGeom prst="rect">
+            <a:avLst/>
+          </a:prstGeom>
         </p:spPr>
-        <p:txBody>
-          <a:bodyPr/>
-          <a:lstStyle/>
-          <a:p>
-            <a:endParaRPr lang="en-US" dirty="0"/>
-          </a:p>
-        </p:txBody>
-      </p:sp>
+      </p:pic>
+      <p:pic>
+        <p:nvPicPr>
+          <p:cNvPr id="6" name="Picture 2" descr="https://upload-icon.s3.us-east-2.amazonaws.com/uploads/icons/png/18594121091536125453-512.png"/>
+          <p:cNvPicPr>
+            <a:picLocks noChangeAspect="1" noChangeArrowheads="1"/>
+          </p:cNvPicPr>
+          <p:nvPr/>
+        </p:nvPicPr>
+        <p:blipFill>
+          <a:blip r:embed="rId3" cstate="print">
+            <a:extLst>
+              <a:ext uri="{28A0092B-C50C-407E-A947-70E740481C1C}">
+                <a14:useLocalDpi xmlns:a14="http://schemas.microsoft.com/office/drawing/2010/main" val="0"/>
+              </a:ext>
+            </a:extLst>
+          </a:blip>
+          <a:srcRect/>
+          <a:stretch>
+            <a:fillRect/>
+          </a:stretch>
+        </p:blipFill>
+        <p:spPr bwMode="auto">
+          <a:xfrm>
+            <a:off x="10093777" y="475906"/>
+            <a:ext cx="1528356" cy="1528356"/>
+          </a:xfrm>
+          <a:prstGeom prst="rect">
+            <a:avLst/>
+          </a:prstGeom>
+          <a:noFill/>
+          <a:extLst>
+            <a:ext uri="{909E8E84-426E-40DD-AFC4-6F175D3DCCD1}">
+              <a14:hiddenFill xmlns:a14="http://schemas.microsoft.com/office/drawing/2010/main">
+                <a:solidFill>
+                  <a:srgbClr val="FFFFFF"/>
+                </a:solidFill>
+              </a14:hiddenFill>
+            </a:ext>
+          </a:extLst>
+        </p:spPr>
+      </p:pic>
+      <p:pic>
+        <p:nvPicPr>
+          <p:cNvPr id="30" name="Picture 29"/>
+          <p:cNvPicPr>
+            <a:picLocks noChangeAspect="1"/>
+          </p:cNvPicPr>
+          <p:nvPr/>
+        </p:nvPicPr>
+        <p:blipFill>
+          <a:blip r:embed="rId4"/>
+          <a:stretch>
+            <a:fillRect/>
+          </a:stretch>
+        </p:blipFill>
+        <p:spPr>
+          <a:xfrm>
+            <a:off x="234725" y="2802131"/>
+            <a:ext cx="4200794" cy="1303695"/>
+          </a:xfrm>
+          <a:prstGeom prst="rect">
+            <a:avLst/>
+          </a:prstGeom>
+        </p:spPr>
+      </p:pic>
+      <p:pic>
+        <p:nvPicPr>
+          <p:cNvPr id="3" name="Picture 2"/>
+          <p:cNvPicPr>
+            <a:picLocks noChangeAspect="1"/>
+          </p:cNvPicPr>
+          <p:nvPr/>
+        </p:nvPicPr>
+        <p:blipFill>
+          <a:blip r:embed="rId5"/>
+          <a:stretch>
+            <a:fillRect/>
+          </a:stretch>
+        </p:blipFill>
+        <p:spPr>
+          <a:xfrm>
+            <a:off x="4595943" y="2625600"/>
+            <a:ext cx="1649326" cy="1656756"/>
+          </a:xfrm>
+          <a:prstGeom prst="rect">
+            <a:avLst/>
+          </a:prstGeom>
+        </p:spPr>
+      </p:pic>
+      <p:pic>
+        <p:nvPicPr>
+          <p:cNvPr id="4" name="Picture 3"/>
+          <p:cNvPicPr>
+            <a:picLocks noChangeAspect="1"/>
+          </p:cNvPicPr>
+          <p:nvPr/>
+        </p:nvPicPr>
+        <p:blipFill>
+          <a:blip r:embed="rId6"/>
+          <a:stretch>
+            <a:fillRect/>
+          </a:stretch>
+        </p:blipFill>
+        <p:spPr>
+          <a:xfrm>
+            <a:off x="6405693" y="2772140"/>
+            <a:ext cx="2715004" cy="1333686"/>
+          </a:xfrm>
+          <a:prstGeom prst="rect">
+            <a:avLst/>
+          </a:prstGeom>
+        </p:spPr>
+      </p:pic>
+      <p:pic>
+        <p:nvPicPr>
+          <p:cNvPr id="7" name="Picture 6"/>
+          <p:cNvPicPr>
+            <a:picLocks noChangeAspect="1"/>
+          </p:cNvPicPr>
+          <p:nvPr/>
+        </p:nvPicPr>
+        <p:blipFill>
+          <a:blip r:embed="rId7"/>
+          <a:stretch>
+            <a:fillRect/>
+          </a:stretch>
+        </p:blipFill>
+        <p:spPr>
+          <a:xfrm>
+            <a:off x="9120697" y="2677582"/>
+            <a:ext cx="3071303" cy="1552792"/>
+          </a:xfrm>
+          <a:prstGeom prst="rect">
+            <a:avLst/>
+          </a:prstGeom>
+        </p:spPr>
+      </p:pic>
+      <p:pic>
+        <p:nvPicPr>
+          <p:cNvPr id="8" name="Picture 7"/>
+          <p:cNvPicPr>
+            <a:picLocks noChangeAspect="1"/>
+          </p:cNvPicPr>
+          <p:nvPr/>
+        </p:nvPicPr>
+        <p:blipFill>
+          <a:blip r:embed="rId8"/>
+          <a:stretch>
+            <a:fillRect/>
+          </a:stretch>
+        </p:blipFill>
+        <p:spPr>
+          <a:xfrm>
+            <a:off x="671289" y="4422479"/>
+            <a:ext cx="3694375" cy="1609692"/>
+          </a:xfrm>
+          <a:prstGeom prst="rect">
+            <a:avLst/>
+          </a:prstGeom>
+        </p:spPr>
+      </p:pic>
+      <p:pic>
+        <p:nvPicPr>
+          <p:cNvPr id="9" name="Picture 8"/>
+          <p:cNvPicPr>
+            <a:picLocks noChangeAspect="1"/>
+          </p:cNvPicPr>
+          <p:nvPr/>
+        </p:nvPicPr>
+        <p:blipFill>
+          <a:blip r:embed="rId9"/>
+          <a:stretch>
+            <a:fillRect/>
+          </a:stretch>
+        </p:blipFill>
+        <p:spPr>
+          <a:xfrm>
+            <a:off x="4595943" y="4460851"/>
+            <a:ext cx="1642953" cy="1776165"/>
+          </a:xfrm>
+          <a:prstGeom prst="rect">
+            <a:avLst/>
+          </a:prstGeom>
+        </p:spPr>
+      </p:pic>
+      <p:pic>
+        <p:nvPicPr>
+          <p:cNvPr id="10" name="Picture 9"/>
+          <p:cNvPicPr>
+            <a:picLocks noChangeAspect="1"/>
+          </p:cNvPicPr>
+          <p:nvPr/>
+        </p:nvPicPr>
+        <p:blipFill>
+          <a:blip r:embed="rId10"/>
+          <a:stretch>
+            <a:fillRect/>
+          </a:stretch>
+        </p:blipFill>
+        <p:spPr>
+          <a:xfrm>
+            <a:off x="7054174" y="4460851"/>
+            <a:ext cx="3879949" cy="1587252"/>
+          </a:xfrm>
+          <a:prstGeom prst="rect">
+            <a:avLst/>
+          </a:prstGeom>
+        </p:spPr>
+      </p:pic>
     </p:spTree>
     <p:extLst>
       <p:ext uri="{BB962C8B-B14F-4D97-AF65-F5344CB8AC3E}">

</xml_diff>

<commit_message>
Prezentacija: ispravka sitnih grešaka
</commit_message>
<xml_diff>
--- a/UnitTestingFrameworks_VH_JN.pptx
+++ b/UnitTestingFrameworks_VH_JN.pptx
@@ -13920,7 +13920,19 @@
           <a:p>
             <a:r>
               <a:rPr lang="sr-Latn-RS" dirty="0" smtClean="0"/>
-              <a:t>Priža mogućnost da pokreće testove pisane u različitim framework-ima (</a:t>
+              <a:t>Pr</a:t>
+            </a:r>
+            <a:r>
+              <a:rPr lang="en-US" dirty="0" smtClean="0"/>
+              <a:t>u</a:t>
+            </a:r>
+            <a:r>
+              <a:rPr lang="sr-Latn-RS" dirty="0" smtClean="0"/>
+              <a:t>ža </a:t>
+            </a:r>
+            <a:r>
+              <a:rPr lang="sr-Latn-RS" dirty="0" smtClean="0"/>
+              <a:t>mogućnost da pokreće testove pisane u različitim framework-ima (</a:t>
             </a:r>
             <a:r>
               <a:rPr lang="sr-Latn-RS" i="1" dirty="0" smtClean="0"/>
@@ -13946,11 +13958,7 @@
             <a:pPr lvl="1"/>
             <a:r>
               <a:rPr lang="sr-Latn-RS" dirty="0" smtClean="0"/>
-              <a:t>browser-ima </a:t>
-            </a:r>
-            <a:r>
-              <a:rPr lang="sr-Latn-RS" dirty="0" smtClean="0"/>
-              <a:t>(</a:t>
+              <a:t>browser-ima (</a:t>
             </a:r>
             <a:r>
               <a:rPr lang="en-US" i="1" dirty="0"/>
@@ -13972,7 +13980,6 @@
               <a:rPr lang="sr-Latn-RS" dirty="0" smtClean="0"/>
               <a:t>)</a:t>
             </a:r>
-            <a:endParaRPr lang="sr-Latn-RS" dirty="0" smtClean="0"/>
           </a:p>
           <a:p>
             <a:pPr lvl="1"/>
@@ -15175,8 +15182,13 @@
             </a:r>
             <a:r>
               <a:rPr lang="sr-Latn-RS" dirty="0" smtClean="0"/>
-              <a:t>napređuju arhitekturu rešenja</a:t>
-            </a:r>
+              <a:t>napređuju arhitekturu </a:t>
+            </a:r>
+            <a:r>
+              <a:rPr lang="sr-Latn-RS" dirty="0" smtClean="0"/>
+              <a:t>rešenja</a:t>
+            </a:r>
+            <a:endParaRPr lang="sr-Latn-RS" dirty="0" smtClean="0"/>
           </a:p>
           <a:p>
             <a:pPr lvl="1"/>
@@ -15197,8 +15209,16 @@
             </a:r>
             <a:r>
               <a:rPr lang="sr-Latn-RS" dirty="0" smtClean="0"/>
-              <a:t>brzavaju razvoj</a:t>
-            </a:r>
+              <a:t>brzavaju </a:t>
+            </a:r>
+            <a:r>
+              <a:rPr lang="sr-Latn-RS" dirty="0" smtClean="0"/>
+              <a:t>razvoj</a:t>
+            </a:r>
+            <a:endParaRPr lang="en-US" dirty="0" smtClean="0"/>
+          </a:p>
+          <a:p>
+            <a:pPr lvl="1"/>
             <a:endParaRPr lang="en-US" dirty="0"/>
           </a:p>
         </p:txBody>

</xml_diff>